<commit_message>
Updates from live teaching
</commit_message>
<xml_diff>
--- a/final ppt/02-map-the-web.pptx
+++ b/final ppt/02-map-the-web.pptx
@@ -5,7 +5,7 @@
     <p:sldMasterId id="2147483672" r:id="rId1"/>
   </p:sldMasterIdLst>
   <p:notesMasterIdLst>
-    <p:notesMasterId r:id="rId13"/>
+    <p:notesMasterId r:id="rId15"/>
   </p:notesMasterIdLst>
   <p:sldIdLst>
     <p:sldId id="256" r:id="rId2"/>
@@ -17,8 +17,10 @@
     <p:sldId id="262" r:id="rId8"/>
     <p:sldId id="263" r:id="rId9"/>
     <p:sldId id="264" r:id="rId10"/>
-    <p:sldId id="265" r:id="rId11"/>
-    <p:sldId id="266" r:id="rId12"/>
+    <p:sldId id="267" r:id="rId11"/>
+    <p:sldId id="268" r:id="rId12"/>
+    <p:sldId id="265" r:id="rId13"/>
+    <p:sldId id="266" r:id="rId14"/>
   </p:sldIdLst>
   <p:sldSz cx="12192000" cy="6858000"/>
   <p:notesSz cx="6858000" cy="9144000"/>
@@ -325,7 +327,7 @@
           <a:p>
             <a:fld id="{0F9C1CCF-B725-44A7-AA57-5E433BD85C9F}" type="datetimeFigureOut">
               <a:rPr lang="en-US" smtClean="0"/>
-              <a:t>9/2/2021</a:t>
+              <a:t>9/3/2021</a:t>
             </a:fld>
             <a:endParaRPr lang="en-US"/>
           </a:p>
@@ -728,6 +730,532 @@
             <p:ph type="sldImg"/>
           </p:nvPr>
         </p:nvSpPr>
+        <p:spPr/>
+      </p:sp>
+      <p:sp>
+        <p:nvSpPr>
+          <p:cNvPr id="3" name="Notes Placeholder 2"/>
+          <p:cNvSpPr>
+            <a:spLocks noGrp="1"/>
+          </p:cNvSpPr>
+          <p:nvPr>
+            <p:ph type="body" idx="1"/>
+          </p:nvPr>
+        </p:nvSpPr>
+        <p:spPr/>
+        <p:txBody>
+          <a:bodyPr/>
+          <a:lstStyle/>
+          <a:p>
+            <a:pPr lvl="1"/>
+            <a:r>
+              <a:rPr lang="en-GB" dirty="0" smtClean="0"/>
+              <a:t>Facilitator explains to the group that in order to help understand this path, they are going to act out a human version of information moving through the internet, in an obstacle course.</a:t>
+            </a:r>
+          </a:p>
+          <a:p>
+            <a:pPr marL="0" lvl="0" indent="0">
+              <a:buNone/>
+            </a:pPr>
+            <a:endParaRPr lang="en-GB" dirty="0" smtClean="0"/>
+          </a:p>
+          <a:p>
+            <a:pPr lvl="1"/>
+            <a:r>
+              <a:rPr lang="en-GB" dirty="0" smtClean="0"/>
+              <a:t>Start by walking learners through a model of the system. Ask the group to gather underneath the “My computer” sign and ask for three volunteers. Hand three of the volunteers the signs </a:t>
+            </a:r>
+            <a:r>
+              <a:rPr lang="en-GB" dirty="0" err="1" smtClean="0"/>
+              <a:t>labeled</a:t>
+            </a:r>
+            <a:endParaRPr lang="en-GB" dirty="0" smtClean="0"/>
+          </a:p>
+          <a:p>
+            <a:pPr marL="0" lvl="0" indent="0">
+              <a:buNone/>
+            </a:pPr>
+            <a:endParaRPr lang="en-GB" dirty="0" smtClean="0"/>
+          </a:p>
+          <a:p>
+            <a:pPr lvl="2"/>
+            <a:r>
+              <a:rPr lang="en-GB" dirty="0" smtClean="0"/>
+              <a:t>“Hop 1: Local Router”</a:t>
+            </a:r>
+          </a:p>
+          <a:p>
+            <a:pPr marL="0" lvl="0" indent="0">
+              <a:buNone/>
+            </a:pPr>
+            <a:endParaRPr lang="en-GB" dirty="0" smtClean="0"/>
+          </a:p>
+          <a:p>
+            <a:pPr lvl="2"/>
+            <a:r>
+              <a:rPr lang="en-GB" dirty="0" smtClean="0"/>
+              <a:t>“Hop 2: Internet Service Provider”</a:t>
+            </a:r>
+          </a:p>
+          <a:p>
+            <a:pPr marL="0" lvl="0" indent="0">
+              <a:buNone/>
+            </a:pPr>
+            <a:endParaRPr lang="en-GB" dirty="0" smtClean="0"/>
+          </a:p>
+          <a:p>
+            <a:pPr lvl="2"/>
+            <a:r>
+              <a:rPr lang="en-GB" dirty="0" smtClean="0"/>
+              <a:t>“Hop 3: The Server”</a:t>
+            </a:r>
+          </a:p>
+          <a:p>
+            <a:pPr marL="0" lvl="0" indent="0">
+              <a:buNone/>
+            </a:pPr>
+            <a:endParaRPr lang="en-GB" dirty="0" smtClean="0"/>
+          </a:p>
+          <a:p>
+            <a:pPr lvl="1"/>
+            <a:r>
+              <a:rPr lang="en-GB" dirty="0" smtClean="0"/>
+              <a:t>Ask the volunteers to spread out throughout the room.</a:t>
+            </a:r>
+          </a:p>
+          <a:p>
+            <a:pPr marL="0" lvl="0" indent="0">
+              <a:buNone/>
+            </a:pPr>
+            <a:endParaRPr lang="en-GB" dirty="0" smtClean="0"/>
+          </a:p>
+          <a:p>
+            <a:pPr lvl="1"/>
+            <a:r>
+              <a:rPr lang="en-GB" dirty="0" smtClean="0"/>
+              <a:t>Explain that</a:t>
+            </a:r>
+          </a:p>
+          <a:p>
+            <a:pPr marL="0" lvl="0" indent="0">
+              <a:buNone/>
+            </a:pPr>
+            <a:endParaRPr lang="en-GB" dirty="0" smtClean="0"/>
+          </a:p>
+          <a:p>
+            <a:pPr lvl="2"/>
+            <a:r>
+              <a:rPr lang="en-GB" dirty="0" smtClean="0"/>
+              <a:t>the signs represent different “hops” that a web request must go through before it gets to the server that hosts the website a user is looking for</a:t>
+            </a:r>
+          </a:p>
+          <a:p>
+            <a:pPr marL="0" lvl="0" indent="0">
+              <a:buNone/>
+            </a:pPr>
+            <a:endParaRPr lang="en-GB" dirty="0" smtClean="0"/>
+          </a:p>
+          <a:p>
+            <a:pPr lvl="2"/>
+            <a:r>
+              <a:rPr lang="en-GB" dirty="0" smtClean="0"/>
+              <a:t>The rest of the learners are packets of code containing web requests in special computer language, trying to get to the server at the other end of the room.</a:t>
+            </a:r>
+          </a:p>
+          <a:p>
+            <a:pPr marL="0" lvl="0" indent="0">
+              <a:buNone/>
+            </a:pPr>
+            <a:endParaRPr lang="en-GB" dirty="0" smtClean="0"/>
+          </a:p>
+          <a:p>
+            <a:pPr lvl="1"/>
+            <a:r>
+              <a:rPr lang="en-GB" dirty="0" smtClean="0"/>
+              <a:t>Choose one of these “packet” learners to act as a model for the rest of the group before they all start the activity. Give the learners the following scenario:</a:t>
+            </a:r>
+          </a:p>
+          <a:p>
+            <a:pPr marL="0" lvl="0" indent="0">
+              <a:buNone/>
+            </a:pPr>
+            <a:endParaRPr lang="en-GB" dirty="0" smtClean="0"/>
+          </a:p>
+          <a:p>
+            <a:pPr lvl="1"/>
+            <a:r>
+              <a:rPr lang="en-GB" dirty="0" smtClean="0"/>
+              <a:t>I’m at my computer and I decide to watch a video on YouTube. After I type in the web address, my computer converts “youtube.com” into a special kind of coded request (called </a:t>
+            </a:r>
+            <a:r>
+              <a:rPr lang="en-GB" dirty="0" err="1" smtClean="0"/>
+              <a:t>HyperText</a:t>
+            </a:r>
+            <a:r>
+              <a:rPr lang="en-GB" dirty="0" smtClean="0"/>
+              <a:t> Transfer Protocol, or HTTP) that all computers can read.</a:t>
+            </a:r>
+          </a:p>
+          <a:p>
+            <a:pPr marL="0" lvl="0" indent="0">
+              <a:buNone/>
+            </a:pPr>
+            <a:endParaRPr lang="en-GB" dirty="0" smtClean="0"/>
+          </a:p>
+          <a:p>
+            <a:pPr lvl="1"/>
+            <a:r>
+              <a:rPr lang="en-GB" dirty="0" smtClean="0"/>
+              <a:t>My computer then divides that code into several “packets” to send across the network… our volunteer learner represents one of those packets.</a:t>
+            </a:r>
+          </a:p>
+          <a:p>
+            <a:pPr marL="0" lvl="0" indent="0">
+              <a:buNone/>
+            </a:pPr>
+            <a:endParaRPr lang="en-GB" dirty="0" smtClean="0"/>
+          </a:p>
+          <a:p>
+            <a:pPr lvl="1"/>
+            <a:r>
+              <a:rPr lang="en-GB" dirty="0" smtClean="0"/>
+              <a:t>Ask the volunteer learner to walk to the </a:t>
+            </a:r>
+            <a:r>
+              <a:rPr lang="en-GB" dirty="0" err="1" smtClean="0"/>
+              <a:t>the</a:t>
+            </a:r>
+            <a:r>
+              <a:rPr lang="en-GB" dirty="0" smtClean="0"/>
+              <a:t> first hop and explain:</a:t>
+            </a:r>
+          </a:p>
+          <a:p>
+            <a:pPr marL="0" lvl="0" indent="0">
+              <a:buNone/>
+            </a:pPr>
+            <a:endParaRPr lang="en-GB" dirty="0" smtClean="0"/>
+          </a:p>
+          <a:p>
+            <a:pPr lvl="2"/>
+            <a:r>
+              <a:rPr lang="en-GB" dirty="0" smtClean="0"/>
+              <a:t>First the packet will hop through local network devices like routers and modems in your building.</a:t>
+            </a:r>
+          </a:p>
+          <a:p>
+            <a:pPr marL="0" lvl="0" indent="0">
+              <a:buNone/>
+            </a:pPr>
+            <a:endParaRPr lang="en-GB" dirty="0" smtClean="0"/>
+          </a:p>
+          <a:p>
+            <a:pPr lvl="2"/>
+            <a:r>
+              <a:rPr lang="en-GB" dirty="0" smtClean="0"/>
+              <a:t>The local network devices then send the packet to the Internet.</a:t>
+            </a:r>
+          </a:p>
+          <a:p>
+            <a:pPr marL="0" lvl="0" indent="0">
+              <a:buNone/>
+            </a:pPr>
+            <a:endParaRPr lang="en-GB" dirty="0" smtClean="0"/>
+          </a:p>
+          <a:p>
+            <a:pPr lvl="1"/>
+            <a:r>
+              <a:rPr lang="en-GB" dirty="0" smtClean="0"/>
+              <a:t>Have the learner walk to and explain the next hop: After a packet gets to the Internet service provider (ISP) it is sent all the way to one of YouTube’s routers.</a:t>
+            </a:r>
+          </a:p>
+          <a:p>
+            <a:pPr marL="0" lvl="0" indent="0">
+              <a:buNone/>
+            </a:pPr>
+            <a:endParaRPr lang="en-GB" dirty="0" smtClean="0"/>
+          </a:p>
+          <a:p>
+            <a:pPr lvl="2"/>
+            <a:r>
+              <a:rPr lang="en-GB" dirty="0" smtClean="0"/>
+              <a:t>Have the learner walk to and explain the next hop, Once the packet gets through YouTube’s router, it is sent to a server in the company’s headquarters that will stream my video. Explain:</a:t>
+            </a:r>
+          </a:p>
+          <a:p>
+            <a:pPr marL="0" lvl="0" indent="0">
+              <a:buNone/>
+            </a:pPr>
+            <a:endParaRPr lang="en-GB" dirty="0" smtClean="0"/>
+          </a:p>
+          <a:p>
+            <a:pPr lvl="2"/>
+            <a:r>
+              <a:rPr lang="en-GB" dirty="0" smtClean="0"/>
+              <a:t>at the server, In order to get the video to stream on my computer, YouTube’s computer converts my video into packets too, which travel all the way back to my computer on the same path of network devices it took to get to YouTube.</a:t>
+            </a:r>
+          </a:p>
+          <a:p>
+            <a:pPr marL="0" lvl="0" indent="0">
+              <a:buNone/>
+            </a:pPr>
+            <a:endParaRPr lang="en-GB" dirty="0" smtClean="0"/>
+          </a:p>
+          <a:p>
+            <a:pPr lvl="1"/>
+            <a:r>
+              <a:rPr lang="en-GB" dirty="0" smtClean="0"/>
+              <a:t>Ask the example learner to walk back to you, making sure to pause at each hop on the way back.</a:t>
+            </a:r>
+          </a:p>
+          <a:p>
+            <a:pPr marL="0" lvl="0" indent="0">
+              <a:buNone/>
+            </a:pPr>
+            <a:endParaRPr lang="en-GB" dirty="0" smtClean="0"/>
+          </a:p>
+          <a:p>
+            <a:pPr lvl="1"/>
+            <a:r>
+              <a:rPr lang="en-GB" dirty="0" smtClean="0"/>
+              <a:t>Now, let’s increase the complexity of the network– after all, we have millions and millions of servers and clients out there, not just a few! Let’s assign 2 or 3 (or more students) to act as “hop 3” – the server. And let’s get a few more users making requests from client computers, and more students assigned to be packets.</a:t>
+            </a:r>
+          </a:p>
+          <a:p>
+            <a:pPr marL="0" lvl="0" indent="0">
+              <a:buNone/>
+            </a:pPr>
+            <a:endParaRPr lang="en-GB" dirty="0" smtClean="0"/>
+          </a:p>
+          <a:p>
+            <a:pPr lvl="1"/>
+            <a:r>
+              <a:rPr lang="en-GB" dirty="0" smtClean="0"/>
+              <a:t>Assign each server a role– for example, a server could be a YourBank.com, or Amazon.com, or Tickets.com or the local library’s online </a:t>
+            </a:r>
+            <a:r>
+              <a:rPr lang="en-GB" dirty="0" err="1" smtClean="0"/>
+              <a:t>catalog</a:t>
+            </a:r>
+            <a:r>
+              <a:rPr lang="en-GB" dirty="0" smtClean="0"/>
+              <a:t> &gt; Tip! You can brainstorm these by asking learners which sites they use, and the kinds of things they request from those sites.</a:t>
+            </a:r>
+          </a:p>
+          <a:p>
+            <a:pPr marL="0" lvl="0" indent="0">
+              <a:buNone/>
+            </a:pPr>
+            <a:endParaRPr lang="en-GB" dirty="0" smtClean="0"/>
+          </a:p>
+          <a:p>
+            <a:pPr lvl="1"/>
+            <a:r>
+              <a:rPr lang="en-GB" dirty="0" smtClean="0"/>
+              <a:t>Write the server names on cards and ask the servers to hold them.</a:t>
+            </a:r>
+          </a:p>
+          <a:p>
+            <a:pPr marL="0" lvl="0" indent="0">
+              <a:buNone/>
+            </a:pPr>
+            <a:endParaRPr lang="en-GB" dirty="0" smtClean="0"/>
+          </a:p>
+          <a:p>
+            <a:pPr lvl="1"/>
+            <a:r>
+              <a:rPr lang="en-GB" dirty="0" smtClean="0"/>
+              <a:t>Have learners write requests, such as “list of cat toys for sale on Amazon”, or “</a:t>
+            </a:r>
+            <a:r>
+              <a:rPr lang="en-GB" dirty="0" err="1" smtClean="0"/>
+              <a:t>Beyonce</a:t>
+            </a:r>
+            <a:r>
+              <a:rPr lang="en-GB" dirty="0" smtClean="0"/>
+              <a:t> tickets on Tickets.com” on cards– they will hand these to the “packets” &gt; Tip: Ask participants if they want to create an identifier on the their request to make sure the request gets back to the right computer.</a:t>
+            </a:r>
+          </a:p>
+          <a:p>
+            <a:pPr marL="0" lvl="0" indent="0">
+              <a:buNone/>
+            </a:pPr>
+            <a:endParaRPr lang="en-GB" dirty="0" smtClean="0"/>
+          </a:p>
+          <a:p>
+            <a:pPr lvl="1"/>
+            <a:r>
+              <a:rPr lang="en-GB" dirty="0" smtClean="0"/>
+              <a:t>Now it’s time for everyone to try the obstacle course! Explain:</a:t>
+            </a:r>
+          </a:p>
+          <a:p>
+            <a:pPr marL="0" lvl="0" indent="0">
+              <a:buNone/>
+            </a:pPr>
+            <a:endParaRPr lang="en-GB" dirty="0" smtClean="0"/>
+          </a:p>
+          <a:p>
+            <a:pPr lvl="2"/>
+            <a:r>
+              <a:rPr lang="en-GB" dirty="0" smtClean="0"/>
+              <a:t>Have the computer users/client computers hand their requests to the “packets”</a:t>
+            </a:r>
+          </a:p>
+          <a:p>
+            <a:pPr marL="0" lvl="0" indent="0">
+              <a:buNone/>
+            </a:pPr>
+            <a:endParaRPr lang="en-GB" dirty="0" smtClean="0"/>
+          </a:p>
+          <a:p>
+            <a:pPr lvl="2"/>
+            <a:r>
+              <a:rPr lang="en-GB" dirty="0" smtClean="0"/>
+              <a:t>Packets must stop at each “hop” before moving on to the next one.</a:t>
+            </a:r>
+          </a:p>
+          <a:p>
+            <a:pPr marL="0" lvl="0" indent="0">
+              <a:buNone/>
+            </a:pPr>
+            <a:endParaRPr lang="en-GB" dirty="0" smtClean="0"/>
+          </a:p>
+          <a:p>
+            <a:pPr lvl="1"/>
+            <a:r>
+              <a:rPr lang="en-GB" dirty="0" smtClean="0"/>
+              <a:t>But wait, there’s a twist! Before the packets can get from one hop to the next, they need to show their request to the stop, which is a kind of gatekeeper.</a:t>
+            </a:r>
+          </a:p>
+          <a:p>
+            <a:pPr marL="0" lvl="0" indent="0">
+              <a:buNone/>
+            </a:pPr>
+            <a:endParaRPr lang="en-GB" dirty="0" smtClean="0"/>
+          </a:p>
+          <a:p>
+            <a:pPr lvl="1"/>
+            <a:r>
+              <a:rPr lang="en-GB" dirty="0" smtClean="0"/>
+              <a:t>At the ISP hop, the learner acting as an ISP will need to direct the packets to the correct servers; on the way back s/he will need to direct the packet to the correct client.</a:t>
+            </a:r>
+          </a:p>
+          <a:p>
+            <a:pPr marL="0" lvl="0" indent="0">
+              <a:buNone/>
+            </a:pPr>
+            <a:endParaRPr lang="en-GB" dirty="0" smtClean="0"/>
+          </a:p>
+          <a:p>
+            <a:pPr lvl="1"/>
+            <a:r>
+              <a:rPr lang="en-GB" dirty="0" smtClean="0"/>
+              <a:t>The servers have a short time to mark or change the packet’s card with the requested info before sending the packet back to the client</a:t>
+            </a:r>
+          </a:p>
+          <a:p>
+            <a:pPr marL="0" lvl="0" indent="0">
+              <a:buNone/>
+            </a:pPr>
+            <a:endParaRPr lang="en-GB" dirty="0" smtClean="0"/>
+          </a:p>
+          <a:p>
+            <a:pPr lvl="1"/>
+            <a:r>
+              <a:rPr lang="en-GB" dirty="0" smtClean="0"/>
+              <a:t>Ask the packets to form a single-file line and move through the obstacle course as quick as they can! You can have someone time how long it takes everyone to get through the course to see who makes it the fastest. &gt; Tip: to make the obstacle course more interesting, you might place “government spies” between hops. This resource from the EFF explains how third parties might intercept data between hops. Talk with your learners about what data is protected, what’s vulnerable, and to whom. &gt; Tip! if your group is large enough, flood the ISP with requests for a certain server &gt; Tip! During the activity, you may ask learners the following questions: &gt; * What happens at each “hop”? &gt; * Do you think a packet in real life moves faster through the Internet than you did?</a:t>
+            </a:r>
+          </a:p>
+          <a:p>
+            <a:pPr marL="0" lvl="0" indent="0">
+              <a:buNone/>
+            </a:pPr>
+            <a:endParaRPr lang="en-GB" dirty="0" smtClean="0"/>
+          </a:p>
+          <a:p>
+            <a:pPr lvl="1"/>
+            <a:r>
+              <a:rPr lang="en-GB" dirty="0" smtClean="0"/>
+              <a:t>Note: If you don’t have the physical space for this activity, learners can create their understanding of how the parts of the web interact by using objects such as </a:t>
+            </a:r>
+            <a:r>
+              <a:rPr lang="en-GB" dirty="0" err="1" smtClean="0"/>
+              <a:t>play-doh</a:t>
+            </a:r>
+            <a:r>
+              <a:rPr lang="en-GB" smtClean="0"/>
+              <a:t>, straws, strings, or other objects.</a:t>
+            </a:r>
+          </a:p>
+          <a:p>
+            <a:endParaRPr lang="en-GB"/>
+          </a:p>
+        </p:txBody>
+      </p:sp>
+      <p:sp>
+        <p:nvSpPr>
+          <p:cNvPr id="4" name="Slide Number Placeholder 3"/>
+          <p:cNvSpPr>
+            <a:spLocks noGrp="1"/>
+          </p:cNvSpPr>
+          <p:nvPr>
+            <p:ph type="sldNum" sz="quarter" idx="10"/>
+          </p:nvPr>
+        </p:nvSpPr>
+        <p:spPr/>
+        <p:txBody>
+          <a:bodyPr/>
+          <a:lstStyle/>
+          <a:p>
+            <a:fld id="{18BDFEC3-8487-43E8-A154-7C12CBC1FFF2}" type="slidenum">
+              <a:rPr lang="en-US" smtClean="0"/>
+              <a:t>11</a:t>
+            </a:fld>
+            <a:endParaRPr lang="en-US"/>
+          </a:p>
+        </p:txBody>
+      </p:sp>
+    </p:spTree>
+    <p:extLst>
+      <p:ext uri="{BB962C8B-B14F-4D97-AF65-F5344CB8AC3E}">
+        <p14:creationId xmlns:p14="http://schemas.microsoft.com/office/powerpoint/2010/main" val="3861448712"/>
+      </p:ext>
+    </p:extLst>
+  </p:cSld>
+  <p:clrMapOvr>
+    <a:masterClrMapping/>
+  </p:clrMapOvr>
+</p:notes>
+</file>
+
+<file path=ppt/notesSlides/notesSlide11.xml><?xml version="1.0" encoding="utf-8"?>
+<p:notes xmlns:a="http://schemas.openxmlformats.org/drawingml/2006/main" xmlns:r="http://schemas.openxmlformats.org/officeDocument/2006/relationships" xmlns:p="http://schemas.openxmlformats.org/presentationml/2006/main">
+  <p:cSld>
+    <p:spTree>
+      <p:nvGrpSpPr>
+        <p:cNvPr id="1" name=""/>
+        <p:cNvGrpSpPr/>
+        <p:nvPr/>
+      </p:nvGrpSpPr>
+      <p:grpSpPr>
+        <a:xfrm>
+          <a:off x="0" y="0"/>
+          <a:ext cx="0" cy="0"/>
+          <a:chOff x="0" y="0"/>
+          <a:chExt cx="0" cy="0"/>
+        </a:xfrm>
+      </p:grpSpPr>
+      <p:sp>
+        <p:nvSpPr>
+          <p:cNvPr id="2" name="Slide Image Placeholder 1"/>
+          <p:cNvSpPr>
+            <a:spLocks noGrp="1" noRot="1" noChangeAspect="1"/>
+          </p:cNvSpPr>
+          <p:nvPr>
+            <p:ph type="sldImg"/>
+          </p:nvPr>
+        </p:nvSpPr>
         <p:spPr>
           <a:xfrm>
             <a:off x="685800" y="1143000"/>
@@ -768,7 +1296,7 @@
             <a:pPr lvl="1"/>
             <a:r>
               <a:rPr/>
-              <a:t>In closing, facilitator may ask reflection questions like:</a:t>
+              <a:t>Discuss the idea of an address– what makes an address (like a street address, or an email address) useful?</a:t>
             </a:r>
           </a:p>
           <a:p>
@@ -781,7 +1309,7 @@
             <a:pPr lvl="1"/>
             <a:r>
               <a:rPr/>
-              <a:t>Be sure to thank learners for their participation, ideas, and insights.</a:t>
+              <a:t>Explain that it’s important that the address is unique– it points to a specific home or apartment or person, a message sent there goes to that place or person only.</a:t>
             </a:r>
           </a:p>
           <a:p>
@@ -791,30 +1319,10 @@
             <a:endParaRPr/>
           </a:p>
           <a:p>
-            <a:pPr marL="0" lvl="0" indent="0">
-              <a:spcBef>
-                <a:spcPts val="3000"/>
-              </a:spcBef>
-              <a:buNone/>
-            </a:pPr>
-            <a:r>
-              <a:rPr b="1"/>
-              <a:t>Learning Experience Reflection</a:t>
-            </a:r>
-          </a:p>
-          <a:p>
-            <a:pPr marL="0" lvl="0" indent="0">
-              <a:buNone/>
-            </a:pPr>
-            <a:endParaRPr b="1"/>
-          </a:p>
-          <a:p>
-            <a:pPr marL="0" lvl="0" indent="0">
-              <a:buNone/>
-            </a:pPr>
+            <a:pPr lvl="1"/>
             <a:r>
               <a:rPr/>
-              <a:t>[5 mins] * What did you like about this activity? * If you might teach this activity to a particular audience, what might you change about the process, structure, or content to better meet the needs of that audience?</a:t>
+              <a:t>Introduce the concept of IP addresses: every device or computer in a network or online has an IP (or “Internet Protocol”) address.</a:t>
             </a:r>
           </a:p>
           <a:p>
@@ -824,28 +1332,51 @@
             <a:endParaRPr/>
           </a:p>
           <a:p>
-            <a:pPr marL="0" lvl="0" indent="0">
-              <a:spcBef>
-                <a:spcPts val="3000"/>
-              </a:spcBef>
-              <a:buNone/>
-            </a:pPr>
-            <a:r>
-              <a:rPr b="1"/>
-              <a:t>Feedback on Core Curriculum</a:t>
-            </a:r>
-          </a:p>
-          <a:p>
-            <a:pPr marL="0" lvl="0" indent="0">
-              <a:buNone/>
-            </a:pPr>
-            <a:endParaRPr b="1"/>
-          </a:p>
-          <a:p>
             <a:pPr lvl="1"/>
             <a:r>
               <a:rPr/>
-              <a:t>Tell us how and where you’re using the curriculum and what you’ve learned and what you might change.</a:t>
+              <a:t>It’s a computer friendly way of describing a website address– computers like numbers!</a:t>
+            </a:r>
+          </a:p>
+          <a:p>
+            <a:pPr marL="0" lvl="0" indent="0">
+              <a:buNone/>
+            </a:pPr>
+            <a:endParaRPr/>
+          </a:p>
+          <a:p>
+            <a:pPr lvl="1"/>
+            <a:r>
+              <a:rPr/>
+              <a:t>IP addresses have 4 sets of numbers in a string.</a:t>
+            </a:r>
+          </a:p>
+          <a:p>
+            <a:pPr marL="0" lvl="0" indent="0">
+              <a:buNone/>
+            </a:pPr>
+            <a:endParaRPr/>
+          </a:p>
+          <a:p>
+            <a:pPr lvl="1"/>
+            <a:r>
+              <a:rPr/>
+              <a:t>If we type this into a browser, it resolves into human-friendly web address.</a:t>
+            </a:r>
+          </a:p>
+          <a:p>
+            <a:pPr marL="0" lvl="0" indent="0">
+              <a:buNone/>
+            </a:pPr>
+            <a:endParaRPr/>
+          </a:p>
+          <a:p>
+            <a:pPr marL="1270000" lvl="0" indent="0">
+              <a:buNone/>
+            </a:pPr>
+            <a:r>
+              <a:rPr sz="2000"/>
+              <a:t>Tip! If a computer is available, demo how entering an IP address takes you to a human friendly domain name</a:t>
             </a:r>
           </a:p>
         </p:txBody>
@@ -867,7 +1398,187 @@
           <a:p>
             <a:fld id="{18BDFEC3-8487-43E8-A154-7C12CBC1FFF2}" type="slidenum">
               <a:rPr lang="en-US"/>
-              <a:t>11</a:t>
+              <a:t>12</a:t>
+            </a:fld>
+            <a:endParaRPr lang="en-US"/>
+          </a:p>
+        </p:txBody>
+      </p:sp>
+    </p:spTree>
+  </p:cSld>
+  <p:clrMapOvr>
+    <a:masterClrMapping/>
+  </p:clrMapOvr>
+</p:notes>
+</file>
+
+<file path=ppt/notesSlides/notesSlide12.xml><?xml version="1.0" encoding="utf-8"?>
+<p:notes xmlns:a="http://schemas.openxmlformats.org/drawingml/2006/main" xmlns:r="http://schemas.openxmlformats.org/officeDocument/2006/relationships" xmlns:p="http://schemas.openxmlformats.org/presentationml/2006/main">
+  <p:cSld>
+    <p:spTree>
+      <p:nvGrpSpPr>
+        <p:cNvPr id="1" name=""/>
+        <p:cNvGrpSpPr/>
+        <p:nvPr/>
+      </p:nvGrpSpPr>
+      <p:grpSpPr>
+        <a:xfrm>
+          <a:off x="0" y="0"/>
+          <a:ext cx="0" cy="0"/>
+          <a:chOff x="0" y="0"/>
+          <a:chExt cx="0" cy="0"/>
+        </a:xfrm>
+      </p:grpSpPr>
+      <p:sp>
+        <p:nvSpPr>
+          <p:cNvPr id="2" name="Slide Image Placeholder 1"/>
+          <p:cNvSpPr>
+            <a:spLocks noGrp="1" noRot="1" noChangeAspect="1"/>
+          </p:cNvSpPr>
+          <p:nvPr>
+            <p:ph type="sldImg"/>
+          </p:nvPr>
+        </p:nvSpPr>
+        <p:spPr>
+          <a:xfrm>
+            <a:off x="685800" y="1143000"/>
+            <a:ext cx="5486400" cy="3086100"/>
+          </a:xfrm>
+        </p:spPr>
+      </p:sp>
+      <p:sp>
+        <p:nvSpPr>
+          <p:cNvPr id="3" name="Notes Placeholder 2"/>
+          <p:cNvSpPr>
+            <a:spLocks noGrp="1"/>
+          </p:cNvSpPr>
+          <p:nvPr>
+            <p:ph type="body" idx="1"/>
+          </p:nvPr>
+        </p:nvSpPr>
+        <p:spPr/>
+        <p:txBody>
+          <a:bodyPr/>
+          <a:lstStyle/>
+          <a:p>
+            <a:pPr marL="0" lvl="0" indent="0">
+              <a:buNone/>
+            </a:pPr>
+            <a:r>
+              <a:rPr/>
+              <a:t>[5 mins]</a:t>
+            </a:r>
+          </a:p>
+          <a:p>
+            <a:pPr marL="0" lvl="0" indent="0">
+              <a:buNone/>
+            </a:pPr>
+            <a:endParaRPr/>
+          </a:p>
+          <a:p>
+            <a:pPr lvl="1"/>
+            <a:r>
+              <a:rPr/>
+              <a:t>In closing, facilitator may ask reflection questions like:</a:t>
+            </a:r>
+          </a:p>
+          <a:p>
+            <a:pPr marL="0" lvl="0" indent="0">
+              <a:buNone/>
+            </a:pPr>
+            <a:endParaRPr/>
+          </a:p>
+          <a:p>
+            <a:pPr lvl="1"/>
+            <a:r>
+              <a:rPr/>
+              <a:t>Be sure to thank learners for their participation, ideas, and insights.</a:t>
+            </a:r>
+          </a:p>
+          <a:p>
+            <a:pPr marL="0" lvl="0" indent="0">
+              <a:buNone/>
+            </a:pPr>
+            <a:endParaRPr/>
+          </a:p>
+          <a:p>
+            <a:pPr marL="0" lvl="0" indent="0">
+              <a:spcBef>
+                <a:spcPts val="3000"/>
+              </a:spcBef>
+              <a:buNone/>
+            </a:pPr>
+            <a:r>
+              <a:rPr b="1"/>
+              <a:t>Learning Experience Reflection</a:t>
+            </a:r>
+          </a:p>
+          <a:p>
+            <a:pPr marL="0" lvl="0" indent="0">
+              <a:buNone/>
+            </a:pPr>
+            <a:endParaRPr b="1"/>
+          </a:p>
+          <a:p>
+            <a:pPr marL="0" lvl="0" indent="0">
+              <a:buNone/>
+            </a:pPr>
+            <a:r>
+              <a:rPr/>
+              <a:t>[5 mins] * What did you like about this activity? * If you might teach this activity to a particular audience, what might you change about the process, structure, or content to better meet the needs of that audience?</a:t>
+            </a:r>
+          </a:p>
+          <a:p>
+            <a:pPr marL="0" lvl="0" indent="0">
+              <a:buNone/>
+            </a:pPr>
+            <a:endParaRPr/>
+          </a:p>
+          <a:p>
+            <a:pPr marL="0" lvl="0" indent="0">
+              <a:spcBef>
+                <a:spcPts val="3000"/>
+              </a:spcBef>
+              <a:buNone/>
+            </a:pPr>
+            <a:r>
+              <a:rPr b="1"/>
+              <a:t>Feedback on Core Curriculum</a:t>
+            </a:r>
+          </a:p>
+          <a:p>
+            <a:pPr marL="0" lvl="0" indent="0">
+              <a:buNone/>
+            </a:pPr>
+            <a:endParaRPr b="1"/>
+          </a:p>
+          <a:p>
+            <a:pPr lvl="1"/>
+            <a:r>
+              <a:rPr/>
+              <a:t>Tell us how and where you’re using the curriculum and what you’ve learned and what you might change.</a:t>
+            </a:r>
+          </a:p>
+        </p:txBody>
+      </p:sp>
+      <p:sp>
+        <p:nvSpPr>
+          <p:cNvPr id="4" name="Slide Number Placeholder 3"/>
+          <p:cNvSpPr>
+            <a:spLocks noGrp="1"/>
+          </p:cNvSpPr>
+          <p:nvPr>
+            <p:ph type="sldNum" sz="quarter" idx="10"/>
+          </p:nvPr>
+        </p:nvSpPr>
+        <p:spPr/>
+        <p:txBody>
+          <a:bodyPr/>
+          <a:lstStyle/>
+          <a:p>
+            <a:fld id="{18BDFEC3-8487-43E8-A154-7C12CBC1FFF2}" type="slidenum">
+              <a:rPr lang="en-US"/>
+              <a:t>13</a:t>
             </a:fld>
             <a:endParaRPr lang="en-US"/>
           </a:p>
@@ -1849,20 +2560,28 @@
               <a:buNone/>
             </a:pPr>
             <a:r>
-              <a:rPr/>
-              <a:t>[5 mins]</a:t>
-            </a:r>
-          </a:p>
-          <a:p>
-            <a:pPr marL="0" lvl="0" indent="0">
-              <a:buNone/>
-            </a:pPr>
-            <a:endParaRPr/>
+              <a:rPr dirty="0"/>
+              <a:t>[5 </a:t>
+            </a:r>
+            <a:r>
+              <a:rPr dirty="0" err="1"/>
+              <a:t>mins</a:t>
+            </a:r>
+            <a:r>
+              <a:rPr dirty="0"/>
+              <a:t>]</a:t>
+            </a:r>
+          </a:p>
+          <a:p>
+            <a:pPr marL="0" lvl="0" indent="0">
+              <a:buNone/>
+            </a:pPr>
+            <a:endParaRPr dirty="0"/>
           </a:p>
           <a:p>
             <a:pPr lvl="1"/>
             <a:r>
-              <a:rPr/>
+              <a:rPr dirty="0"/>
               <a:t>By placing sticky notes on a board, the group works together to create a diagram of the internet. To help them do so, use the following prompts.</a:t>
             </a:r>
           </a:p>
@@ -1870,27 +2589,35 @@
             <a:pPr marL="0" lvl="0" indent="0">
               <a:buNone/>
             </a:pPr>
-            <a:endParaRPr/>
+            <a:endParaRPr dirty="0"/>
           </a:p>
           <a:p>
             <a:pPr marL="1270000" lvl="0" indent="0">
               <a:buNone/>
             </a:pPr>
             <a:r>
-              <a:rPr sz="2000"/>
-              <a:t>Tip! You can also use tactile 3-D materials like pipe cleaners, play-doh, string, cardboard or construction paper to create a model</a:t>
-            </a:r>
-          </a:p>
-          <a:p>
-            <a:pPr marL="0" lvl="0" indent="0">
-              <a:buNone/>
-            </a:pPr>
-            <a:endParaRPr sz="2000"/>
+              <a:rPr sz="2000" dirty="0"/>
+              <a:t>Tip! You can also use tactile 3-D materials like pipe cleaners, </a:t>
+            </a:r>
+            <a:r>
+              <a:rPr sz="2000" dirty="0" err="1"/>
+              <a:t>play-doh</a:t>
+            </a:r>
+            <a:r>
+              <a:rPr sz="2000" dirty="0"/>
+              <a:t>, string, cardboard or construction paper to create a model</a:t>
+            </a:r>
+          </a:p>
+          <a:p>
+            <a:pPr marL="0" lvl="0" indent="0">
+              <a:buNone/>
+            </a:pPr>
+            <a:endParaRPr sz="2000" dirty="0"/>
           </a:p>
           <a:p>
             <a:pPr lvl="1"/>
             <a:r>
-              <a:rPr/>
+              <a:rPr dirty="0"/>
               <a:t>How are the different elements related? For example, many client computers connect to a single server.</a:t>
             </a:r>
           </a:p>
@@ -1898,12 +2625,12 @@
             <a:pPr marL="0" lvl="0" indent="0">
               <a:buNone/>
             </a:pPr>
-            <a:endParaRPr/>
+            <a:endParaRPr dirty="0"/>
           </a:p>
           <a:p>
             <a:pPr lvl="1"/>
             <a:r>
-              <a:rPr/>
+              <a:rPr dirty="0"/>
               <a:t>Where is information stored or kept, and how does it travel?</a:t>
             </a:r>
           </a:p>
@@ -1911,14 +2638,14 @@
             <a:pPr marL="0" lvl="0" indent="0">
               <a:buNone/>
             </a:pPr>
-            <a:endParaRPr/>
+            <a:endParaRPr dirty="0"/>
           </a:p>
           <a:p>
             <a:pPr marL="1270000" lvl="0" indent="0">
               <a:buNone/>
             </a:pPr>
             <a:r>
-              <a:rPr sz="2000"/>
+              <a:rPr sz="2000" dirty="0"/>
               <a:t>Tip! If learners are very new to these concepts, the facilitator can set up the map herself, explaining each step, the relationships, and how information moves through the system.</a:t>
             </a:r>
           </a:p>
@@ -2008,20 +2735,34 @@
               <a:buNone/>
             </a:pPr>
             <a:r>
-              <a:rPr/>
-              <a:t>[15-20 mins]</a:t>
-            </a:r>
-          </a:p>
-          <a:p>
-            <a:pPr marL="0" lvl="0" indent="0">
-              <a:buNone/>
-            </a:pPr>
-            <a:endParaRPr/>
+              <a:rPr dirty="0"/>
+              <a:t>[15-20 </a:t>
+            </a:r>
+            <a:r>
+              <a:rPr dirty="0" err="1"/>
+              <a:t>mins</a:t>
+            </a:r>
+            <a:r>
+              <a:rPr dirty="0"/>
+              <a:t>]</a:t>
+            </a:r>
+          </a:p>
+          <a:p>
+            <a:pPr marL="0" lvl="0" indent="0">
+              <a:buNone/>
+            </a:pPr>
+            <a:endParaRPr lang="en-GB" dirty="0" smtClean="0"/>
+          </a:p>
+          <a:p>
+            <a:pPr marL="0" lvl="0" indent="0">
+              <a:buNone/>
+            </a:pPr>
+            <a:endParaRPr dirty="0"/>
           </a:p>
           <a:p>
             <a:pPr lvl="1"/>
             <a:r>
-              <a:rPr/>
+              <a:rPr dirty="0"/>
               <a:t>The facilitator should review the following:</a:t>
             </a:r>
           </a:p>
@@ -2029,12 +2770,12 @@
             <a:pPr marL="0" lvl="0" indent="0">
               <a:buNone/>
             </a:pPr>
-            <a:endParaRPr/>
+            <a:endParaRPr dirty="0"/>
           </a:p>
           <a:p>
             <a:pPr lvl="1"/>
             <a:r>
-              <a:rPr/>
+              <a:rPr dirty="0"/>
               <a:t>We see in our map that the “Internet” is a system of networked computers and the “Web” is located on Internet.</a:t>
             </a:r>
           </a:p>
@@ -2042,12 +2783,12 @@
             <a:pPr marL="0" lvl="0" indent="0">
               <a:buNone/>
             </a:pPr>
-            <a:endParaRPr/>
+            <a:endParaRPr dirty="0"/>
           </a:p>
           <a:p>
             <a:pPr lvl="1"/>
             <a:r>
-              <a:rPr/>
+              <a:rPr dirty="0"/>
               <a:t>The web is the interconnected system of sites and pages, stored in various computers around the world.</a:t>
             </a:r>
           </a:p>
@@ -2055,12 +2796,12 @@
             <a:pPr marL="0" lvl="0" indent="0">
               <a:buNone/>
             </a:pPr>
-            <a:endParaRPr/>
+            <a:endParaRPr dirty="0"/>
           </a:p>
           <a:p>
             <a:pPr lvl="1"/>
             <a:r>
-              <a:rPr/>
+              <a:rPr dirty="0"/>
               <a:t>We use a web browser, like Firefox, to access pages on the Web.</a:t>
             </a:r>
           </a:p>
@@ -2068,12 +2809,12 @@
             <a:pPr marL="0" lvl="0" indent="0">
               <a:buNone/>
             </a:pPr>
-            <a:endParaRPr/>
+            <a:endParaRPr dirty="0"/>
           </a:p>
           <a:p>
             <a:pPr lvl="1"/>
             <a:r>
-              <a:rPr/>
+              <a:rPr dirty="0"/>
               <a:t>Anytime you ask the Internet to do something- entering a web address into a browser, watching a video on YouTube, or check an email on your smartphone– your request “hops” through several network devices, like routers and switches and servers, on its way from your device to the website’s server.</a:t>
             </a:r>
           </a:p>
@@ -2081,417 +2822,29 @@
             <a:pPr marL="0" lvl="0" indent="0">
               <a:buNone/>
             </a:pPr>
-            <a:endParaRPr/>
-          </a:p>
-          <a:p>
-            <a:pPr lvl="1"/>
-            <a:r>
-              <a:rPr/>
-              <a:t>After watching the video, take a few minutes and ask participants to compare and contrast what they learned from watching the video compared to what they hypothesized together beforehand. How close were we? What did we leave out? What surprised us?</a:t>
-            </a:r>
-          </a:p>
-          <a:p>
-            <a:pPr marL="0" lvl="0" indent="0">
-              <a:buNone/>
-            </a:pPr>
-            <a:endParaRPr/>
-          </a:p>
-          <a:p>
-            <a:pPr lvl="1"/>
-            <a:r>
-              <a:rPr/>
-              <a:t>Facilitator explains to the group that in order to help understand this path, they are going to act out a human version of information moving through the internet, in an obstacle course.</a:t>
-            </a:r>
-          </a:p>
-          <a:p>
-            <a:pPr marL="0" lvl="0" indent="0">
-              <a:buNone/>
-            </a:pPr>
-            <a:endParaRPr/>
-          </a:p>
-          <a:p>
-            <a:pPr lvl="1"/>
-            <a:r>
-              <a:rPr/>
-              <a:t>Start by walking learners through a model of the system. Ask the group to gather underneath the “My computer” sign and ask for three volunteers. Hand three of the volunteers the signs labeled</a:t>
-            </a:r>
-          </a:p>
-          <a:p>
-            <a:pPr marL="0" lvl="0" indent="0">
-              <a:buNone/>
-            </a:pPr>
-            <a:endParaRPr/>
-          </a:p>
-          <a:p>
-            <a:pPr lvl="2"/>
-            <a:r>
-              <a:rPr/>
-              <a:t>“Hop 1: Local Router”</a:t>
-            </a:r>
-          </a:p>
-          <a:p>
-            <a:pPr marL="0" lvl="0" indent="0">
-              <a:buNone/>
-            </a:pPr>
-            <a:endParaRPr/>
-          </a:p>
-          <a:p>
-            <a:pPr lvl="2"/>
-            <a:r>
-              <a:rPr/>
-              <a:t>“Hop 2: Internet Service Provider”</a:t>
-            </a:r>
-          </a:p>
-          <a:p>
-            <a:pPr marL="0" lvl="0" indent="0">
-              <a:buNone/>
-            </a:pPr>
-            <a:endParaRPr/>
-          </a:p>
-          <a:p>
-            <a:pPr lvl="2"/>
-            <a:r>
-              <a:rPr/>
-              <a:t>“Hop 3: The Server”</a:t>
-            </a:r>
-          </a:p>
-          <a:p>
-            <a:pPr marL="0" lvl="0" indent="0">
-              <a:buNone/>
-            </a:pPr>
-            <a:endParaRPr/>
-          </a:p>
-          <a:p>
-            <a:pPr lvl="1"/>
-            <a:r>
-              <a:rPr/>
-              <a:t>Ask the volunteers to spread out throughout the room.</a:t>
-            </a:r>
-          </a:p>
-          <a:p>
-            <a:pPr marL="0" lvl="0" indent="0">
-              <a:buNone/>
-            </a:pPr>
-            <a:endParaRPr/>
-          </a:p>
-          <a:p>
-            <a:pPr lvl="1"/>
-            <a:r>
-              <a:rPr/>
-              <a:t>Explain that</a:t>
-            </a:r>
-          </a:p>
-          <a:p>
-            <a:pPr marL="0" lvl="0" indent="0">
-              <a:buNone/>
-            </a:pPr>
-            <a:endParaRPr/>
-          </a:p>
-          <a:p>
-            <a:pPr lvl="2"/>
-            <a:r>
-              <a:rPr/>
-              <a:t>the signs represent different “hops” that a web request must go through before it gets to the server that hosts the website a user is looking for</a:t>
-            </a:r>
-          </a:p>
-          <a:p>
-            <a:pPr marL="0" lvl="0" indent="0">
-              <a:buNone/>
-            </a:pPr>
-            <a:endParaRPr/>
-          </a:p>
-          <a:p>
-            <a:pPr lvl="2"/>
-            <a:r>
-              <a:rPr/>
-              <a:t>The rest of the learners are packets of code containing web requests in special computer language, trying to get to the server at the other end of the room.</a:t>
-            </a:r>
-          </a:p>
-          <a:p>
-            <a:pPr marL="0" lvl="0" indent="0">
-              <a:buNone/>
-            </a:pPr>
-            <a:endParaRPr/>
-          </a:p>
-          <a:p>
-            <a:pPr lvl="1"/>
-            <a:r>
-              <a:rPr/>
-              <a:t>Choose one of these “packet” learners to act as a model for the rest of the group before they all start the activity. Give the learners the following scenario:</a:t>
-            </a:r>
-          </a:p>
-          <a:p>
-            <a:pPr marL="0" lvl="0" indent="0">
-              <a:buNone/>
-            </a:pPr>
-            <a:endParaRPr/>
-          </a:p>
-          <a:p>
-            <a:pPr lvl="1"/>
-            <a:r>
-              <a:rPr/>
-              <a:t>I’m at my computer and I decide to watch a video on YouTube. After I type in the web address, my computer converts “youtube.com” into a special kind of coded request (called HyperText Transfer Protocol, or HTTP) that all computers can read.</a:t>
-            </a:r>
-          </a:p>
-          <a:p>
-            <a:pPr marL="0" lvl="0" indent="0">
-              <a:buNone/>
-            </a:pPr>
-            <a:endParaRPr/>
-          </a:p>
-          <a:p>
-            <a:pPr lvl="1"/>
-            <a:r>
-              <a:rPr/>
-              <a:t>My computer then divides that code into several “packets” to send across the network… our volunteer learner represents one of those packets.</a:t>
-            </a:r>
-          </a:p>
-          <a:p>
-            <a:pPr marL="0" lvl="0" indent="0">
-              <a:buNone/>
-            </a:pPr>
-            <a:endParaRPr/>
-          </a:p>
-          <a:p>
-            <a:pPr lvl="1"/>
-            <a:r>
-              <a:rPr/>
-              <a:t>Ask the volunteer learner to walk to the the first hop and explain:</a:t>
-            </a:r>
-          </a:p>
-          <a:p>
-            <a:pPr marL="0" lvl="0" indent="0">
-              <a:buNone/>
-            </a:pPr>
-            <a:endParaRPr/>
-          </a:p>
-          <a:p>
-            <a:pPr lvl="2"/>
-            <a:r>
-              <a:rPr/>
-              <a:t>First the packet will hop through local network devices like routers and modems in your building.</a:t>
-            </a:r>
-          </a:p>
-          <a:p>
-            <a:pPr marL="0" lvl="0" indent="0">
-              <a:buNone/>
-            </a:pPr>
-            <a:endParaRPr/>
-          </a:p>
-          <a:p>
-            <a:pPr lvl="2"/>
-            <a:r>
-              <a:rPr/>
-              <a:t>The local network devices then send the packet to the Internet.</a:t>
-            </a:r>
-          </a:p>
-          <a:p>
-            <a:pPr marL="0" lvl="0" indent="0">
-              <a:buNone/>
-            </a:pPr>
-            <a:endParaRPr/>
-          </a:p>
-          <a:p>
-            <a:pPr lvl="1"/>
-            <a:r>
-              <a:rPr/>
-              <a:t>Have the learner walk to and explain the next hop: After a packet gets to the Internet service provider (ISP) it is sent all the way to one of YouTube’s routers.</a:t>
-            </a:r>
-          </a:p>
-          <a:p>
-            <a:pPr marL="0" lvl="0" indent="0">
-              <a:buNone/>
-            </a:pPr>
-            <a:endParaRPr/>
-          </a:p>
-          <a:p>
-            <a:pPr lvl="2"/>
-            <a:r>
-              <a:rPr/>
-              <a:t>Have the learner walk to and explain the next hop, Once the packet gets through YouTube’s router, it is sent to a server in the company’s headquarters that will stream my video. Explain:</a:t>
-            </a:r>
-          </a:p>
-          <a:p>
-            <a:pPr marL="0" lvl="0" indent="0">
-              <a:buNone/>
-            </a:pPr>
-            <a:endParaRPr/>
-          </a:p>
-          <a:p>
-            <a:pPr lvl="2"/>
-            <a:r>
-              <a:rPr/>
-              <a:t>at the server, In order to get the video to stream on my computer, YouTube’s computer converts my video into packets too, which travel all the way back to my computer on the same path of network devices it took to get to YouTube.</a:t>
-            </a:r>
-          </a:p>
-          <a:p>
-            <a:pPr marL="0" lvl="0" indent="0">
-              <a:buNone/>
-            </a:pPr>
-            <a:endParaRPr/>
-          </a:p>
-          <a:p>
-            <a:pPr lvl="1"/>
-            <a:r>
-              <a:rPr/>
-              <a:t>Ask the example learner to walk back to you, making sure to pause at each hop on the way back.</a:t>
-            </a:r>
-          </a:p>
-          <a:p>
-            <a:pPr marL="0" lvl="0" indent="0">
-              <a:buNone/>
-            </a:pPr>
-            <a:endParaRPr/>
-          </a:p>
-          <a:p>
-            <a:pPr lvl="1"/>
-            <a:r>
-              <a:rPr/>
-              <a:t>Now, let’s increase the complexity of the network– after all, we have millions and millions of servers and clients out there, not just a few! Let’s assign 2 or 3 (or more students) to act as “hop 3” – the server. And let’s get a few more users making requests from client computers, and more students assigned to be packets.</a:t>
-            </a:r>
-          </a:p>
-          <a:p>
-            <a:pPr marL="0" lvl="0" indent="0">
-              <a:buNone/>
-            </a:pPr>
-            <a:endParaRPr/>
-          </a:p>
-          <a:p>
-            <a:pPr lvl="1"/>
-            <a:r>
-              <a:rPr/>
-              <a:t>Assign each server a role– for example, a server could be a YourBank.com, or Amazon.com, or Tickets.com or the local library’s online catalog &gt; Tip! You can brainstorm these by asking learners which sites they use, and the kinds of things they request from those sites.</a:t>
-            </a:r>
-          </a:p>
-          <a:p>
-            <a:pPr marL="0" lvl="0" indent="0">
-              <a:buNone/>
-            </a:pPr>
-            <a:endParaRPr/>
-          </a:p>
-          <a:p>
-            <a:pPr lvl="1"/>
-            <a:r>
-              <a:rPr/>
-              <a:t>Write the server names on cards and ask the servers to hold them.</a:t>
-            </a:r>
-          </a:p>
-          <a:p>
-            <a:pPr marL="0" lvl="0" indent="0">
-              <a:buNone/>
-            </a:pPr>
-            <a:endParaRPr/>
-          </a:p>
-          <a:p>
-            <a:pPr lvl="1"/>
-            <a:r>
-              <a:rPr/>
-              <a:t>Have learners write requests, such as “list of cat toys for sale on Amazon”, or “Beyonce tickets on Tickets.com” on cards– they will hand these to the “packets” &gt; Tip: Ask participants if they want to create an identifier on the their request to make sure the request gets back to the right computer.</a:t>
-            </a:r>
-          </a:p>
-          <a:p>
-            <a:pPr marL="0" lvl="0" indent="0">
-              <a:buNone/>
-            </a:pPr>
-            <a:endParaRPr/>
-          </a:p>
-          <a:p>
-            <a:pPr lvl="1"/>
-            <a:r>
-              <a:rPr/>
-              <a:t>Now it’s time for everyone to try the obstacle course! Explain:</a:t>
-            </a:r>
-          </a:p>
-          <a:p>
-            <a:pPr marL="0" lvl="0" indent="0">
-              <a:buNone/>
-            </a:pPr>
-            <a:endParaRPr/>
-          </a:p>
-          <a:p>
-            <a:pPr lvl="2"/>
-            <a:r>
-              <a:rPr/>
-              <a:t>Have the computer users/client computers hand their requests to the “packets”</a:t>
-            </a:r>
-          </a:p>
-          <a:p>
-            <a:pPr marL="0" lvl="0" indent="0">
-              <a:buNone/>
-            </a:pPr>
-            <a:endParaRPr/>
-          </a:p>
-          <a:p>
-            <a:pPr lvl="2"/>
-            <a:r>
-              <a:rPr/>
-              <a:t>Packets must stop at each “hop” before moving on to the next one.</a:t>
-            </a:r>
-          </a:p>
-          <a:p>
-            <a:pPr marL="0" lvl="0" indent="0">
-              <a:buNone/>
-            </a:pPr>
-            <a:endParaRPr/>
-          </a:p>
-          <a:p>
-            <a:pPr lvl="1"/>
-            <a:r>
-              <a:rPr/>
-              <a:t>But wait, there’s a twist! Before the packets can get from one hop to the next, they need to show their request to the stop, which is a kind of gatekeeper.</a:t>
-            </a:r>
-          </a:p>
-          <a:p>
-            <a:pPr marL="0" lvl="0" indent="0">
-              <a:buNone/>
-            </a:pPr>
-            <a:endParaRPr/>
-          </a:p>
-          <a:p>
-            <a:pPr lvl="1"/>
-            <a:r>
-              <a:rPr/>
-              <a:t>At the ISP hop, the learner acting as an ISP will need to direct the packets to the correct servers; on the way back s/he will need to direct the packet to the correct client.</a:t>
-            </a:r>
-          </a:p>
-          <a:p>
-            <a:pPr marL="0" lvl="0" indent="0">
-              <a:buNone/>
-            </a:pPr>
-            <a:endParaRPr/>
-          </a:p>
-          <a:p>
-            <a:pPr lvl="1"/>
-            <a:r>
-              <a:rPr/>
-              <a:t>The servers have a short time to mark or change the packet’s card with the requested info before sending the packet back to the client</a:t>
-            </a:r>
-          </a:p>
-          <a:p>
-            <a:pPr marL="0" lvl="0" indent="0">
-              <a:buNone/>
-            </a:pPr>
-            <a:endParaRPr/>
-          </a:p>
-          <a:p>
-            <a:pPr lvl="1"/>
-            <a:r>
-              <a:rPr/>
-              <a:t>Ask the packets to form a single-file line and move through the obstacle course as quick as they can! You can have someone time how long it takes everyone to get through the course to see who makes it the fastest. &gt; Tip: to make the obstacle course more interesting, you might place “government spies” between hops. This resource from the EFF explains how third parties might intercept data between hops. Talk with your learners about what data is protected, what’s vulnerable, and to whom. &gt; Tip! if your group is large enough, flood the ISP with requests for a certain server &gt; Tip! During the activity, you may ask learners the following questions: &gt; * What happens at each “hop”? &gt; * Do you think a packet in real life moves faster through the Internet than you did?</a:t>
-            </a:r>
-          </a:p>
-          <a:p>
-            <a:pPr marL="0" lvl="0" indent="0">
-              <a:buNone/>
-            </a:pPr>
-            <a:endParaRPr/>
-          </a:p>
-          <a:p>
-            <a:pPr lvl="1"/>
-            <a:r>
-              <a:rPr/>
-              <a:t>Note: If you don’t have the physical space for this activity, learners can create their understanding of how the parts of the web interact by using objects such as play-doh, straws, strings, or other objects.</a:t>
-            </a:r>
+            <a:endParaRPr lang="en-GB" dirty="0" smtClean="0"/>
+          </a:p>
+          <a:p>
+            <a:pPr marL="0" lvl="0" indent="0">
+              <a:buNone/>
+            </a:pPr>
+            <a:r>
+              <a:rPr lang="en-GB" baseline="0" dirty="0" smtClean="0"/>
+              <a:t>           . </a:t>
+            </a:r>
+            <a:r>
+              <a:rPr lang="en-GB" dirty="0" smtClean="0">
+                <a:hlinkClick r:id="rId3"/>
+              </a:rPr>
+              <a:t>introductory video</a:t>
+            </a:r>
+            <a:endParaRPr lang="en-GB" dirty="0" smtClean="0"/>
+          </a:p>
+          <a:p>
+            <a:pPr marL="0" lvl="0" indent="0">
+              <a:buNone/>
+            </a:pPr>
+            <a:endParaRPr dirty="0"/>
           </a:p>
         </p:txBody>
       </p:sp>
@@ -2553,12 +2906,7 @@
             <p:ph type="sldImg"/>
           </p:nvPr>
         </p:nvSpPr>
-        <p:spPr>
-          <a:xfrm>
-            <a:off x="685800" y="1143000"/>
-            <a:ext cx="5486400" cy="3086100"/>
-          </a:xfrm>
-        </p:spPr>
+        <p:spPr/>
       </p:sp>
       <p:sp>
         <p:nvSpPr>
@@ -2575,106 +2923,20 @@
           <a:bodyPr/>
           <a:lstStyle/>
           <a:p>
-            <a:pPr marL="0" lvl="0" indent="0">
-              <a:buNone/>
-            </a:pPr>
-            <a:r>
-              <a:rPr/>
-              <a:t>[5 mins]</a:t>
-            </a:r>
-          </a:p>
-          <a:p>
-            <a:pPr marL="0" lvl="0" indent="0">
-              <a:buNone/>
-            </a:pPr>
-            <a:endParaRPr/>
-          </a:p>
-          <a:p>
             <a:pPr lvl="1"/>
             <a:r>
-              <a:rPr/>
-              <a:t>Discuss the idea of an address– what makes an address (like a street address, or an email address) useful?</a:t>
-            </a:r>
-          </a:p>
-          <a:p>
-            <a:pPr marL="0" lvl="0" indent="0">
-              <a:buNone/>
-            </a:pPr>
-            <a:endParaRPr/>
-          </a:p>
-          <a:p>
-            <a:pPr lvl="1"/>
-            <a:r>
-              <a:rPr/>
-              <a:t>Explain that it’s important that the address is unique– it points to a specific home or apartment or person, a message sent there goes to that place or person only.</a:t>
-            </a:r>
-          </a:p>
-          <a:p>
-            <a:pPr marL="0" lvl="0" indent="0">
-              <a:buNone/>
-            </a:pPr>
-            <a:endParaRPr/>
-          </a:p>
-          <a:p>
-            <a:pPr lvl="1"/>
-            <a:r>
-              <a:rPr/>
-              <a:t>Introduce the concept of IP addresses: every device or computer in a network or online has an IP (or “Internet Protocol”) address.</a:t>
-            </a:r>
-          </a:p>
-          <a:p>
-            <a:pPr marL="0" lvl="0" indent="0">
-              <a:buNone/>
-            </a:pPr>
-            <a:endParaRPr/>
-          </a:p>
-          <a:p>
-            <a:pPr lvl="1"/>
-            <a:r>
-              <a:rPr/>
-              <a:t>It’s a computer friendly way of describing a website address– computers like numbers!</a:t>
-            </a:r>
-          </a:p>
-          <a:p>
-            <a:pPr marL="0" lvl="0" indent="0">
-              <a:buNone/>
-            </a:pPr>
-            <a:endParaRPr/>
-          </a:p>
-          <a:p>
-            <a:pPr lvl="1"/>
-            <a:r>
-              <a:rPr/>
-              <a:t>IP addresses have 4 sets of numbers in a string.</a:t>
-            </a:r>
-          </a:p>
-          <a:p>
-            <a:pPr marL="0" lvl="0" indent="0">
-              <a:buNone/>
-            </a:pPr>
-            <a:endParaRPr/>
-          </a:p>
-          <a:p>
-            <a:pPr lvl="1"/>
-            <a:r>
-              <a:rPr/>
-              <a:t>If we type this into a browser, it resolves into human-friendly web address.</a:t>
-            </a:r>
-          </a:p>
-          <a:p>
-            <a:pPr marL="0" lvl="0" indent="0">
-              <a:buNone/>
-            </a:pPr>
-            <a:endParaRPr/>
-          </a:p>
-          <a:p>
-            <a:pPr marL="1270000" lvl="0" indent="0">
-              <a:buNone/>
-            </a:pPr>
-            <a:r>
-              <a:rPr sz="2000"/>
-              <a:t>Tip! If a computer is available, demo how entering an IP address takes you to a human friendly domain name</a:t>
-            </a:r>
+              <a:rPr lang="en-GB" dirty="0" smtClean="0"/>
+              <a:t>After watching the video, take a few minutes and ask participants to compare and contrast what they learned from watching the video compared to what they hypothesized together beforehand. How close were we? What did we leave out? What surprised us?</a:t>
+            </a:r>
+          </a:p>
+          <a:p>
+            <a:pPr marL="0" lvl="0" indent="0">
+              <a:buNone/>
+            </a:pPr>
+            <a:endParaRPr lang="en-GB" dirty="0" smtClean="0"/>
+          </a:p>
+          <a:p>
+            <a:endParaRPr lang="en-GB" dirty="0"/>
           </a:p>
         </p:txBody>
       </p:sp>
@@ -2694,7 +2956,7 @@
           <a:lstStyle/>
           <a:p>
             <a:fld id="{18BDFEC3-8487-43E8-A154-7C12CBC1FFF2}" type="slidenum">
-              <a:rPr lang="en-US"/>
+              <a:rPr lang="en-US" smtClean="0"/>
               <a:t>10</a:t>
             </a:fld>
             <a:endParaRPr lang="en-US"/>
@@ -2702,6 +2964,11 @@
         </p:txBody>
       </p:sp>
     </p:spTree>
+    <p:extLst>
+      <p:ext uri="{BB962C8B-B14F-4D97-AF65-F5344CB8AC3E}">
+        <p14:creationId xmlns:p14="http://schemas.microsoft.com/office/powerpoint/2010/main" val="777597441"/>
+      </p:ext>
+    </p:extLst>
   </p:cSld>
   <p:clrMapOvr>
     <a:masterClrMapping/>
@@ -8395,6 +8662,236 @@
           <a:lstStyle/>
           <a:p>
             <a:r>
+              <a:rPr lang="en-GB" dirty="0"/>
+              <a:t>Compare the video and our </a:t>
+            </a:r>
+            <a:r>
+              <a:rPr lang="en-GB" dirty="0" smtClean="0"/>
+              <a:t>diagram</a:t>
+            </a:r>
+            <a:endParaRPr lang="en-GB" dirty="0"/>
+          </a:p>
+        </p:txBody>
+      </p:sp>
+      <p:sp>
+        <p:nvSpPr>
+          <p:cNvPr id="3" name="Text Placeholder 2"/>
+          <p:cNvSpPr>
+            <a:spLocks noGrp="1"/>
+          </p:cNvSpPr>
+          <p:nvPr>
+            <p:ph type="body" idx="1"/>
+          </p:nvPr>
+        </p:nvSpPr>
+        <p:spPr/>
+        <p:txBody>
+          <a:bodyPr/>
+          <a:lstStyle/>
+          <a:p>
+            <a:pPr marL="342900" indent="-342900">
+              <a:buFont typeface="Arial" panose="020B0604020202020204" pitchFamily="34" charset="0"/>
+              <a:buChar char="•"/>
+            </a:pPr>
+            <a:r>
+              <a:rPr lang="en-GB" dirty="0" smtClean="0"/>
+              <a:t>How </a:t>
+            </a:r>
+            <a:r>
+              <a:rPr lang="en-GB" dirty="0"/>
+              <a:t>close were we? </a:t>
+            </a:r>
+          </a:p>
+          <a:p>
+            <a:pPr marL="342900" indent="-342900">
+              <a:buFont typeface="Arial" panose="020B0604020202020204" pitchFamily="34" charset="0"/>
+              <a:buChar char="•"/>
+            </a:pPr>
+            <a:r>
+              <a:rPr lang="en-GB" dirty="0" smtClean="0"/>
+              <a:t>What </a:t>
+            </a:r>
+            <a:r>
+              <a:rPr lang="en-GB" dirty="0"/>
+              <a:t>did we leave out? </a:t>
+            </a:r>
+          </a:p>
+          <a:p>
+            <a:pPr marL="342900" indent="-342900">
+              <a:buFont typeface="Arial" panose="020B0604020202020204" pitchFamily="34" charset="0"/>
+              <a:buChar char="•"/>
+            </a:pPr>
+            <a:r>
+              <a:rPr lang="en-GB" dirty="0" smtClean="0"/>
+              <a:t>What </a:t>
+            </a:r>
+            <a:r>
+              <a:rPr lang="en-GB" dirty="0"/>
+              <a:t>surprised us? </a:t>
+            </a:r>
+          </a:p>
+        </p:txBody>
+      </p:sp>
+    </p:spTree>
+    <p:extLst>
+      <p:ext uri="{BB962C8B-B14F-4D97-AF65-F5344CB8AC3E}">
+        <p14:creationId xmlns:p14="http://schemas.microsoft.com/office/powerpoint/2010/main" val="2455042402"/>
+      </p:ext>
+    </p:extLst>
+  </p:cSld>
+  <p:clrMapOvr>
+    <a:masterClrMapping/>
+  </p:clrMapOvr>
+</p:sld>
+</file>
+
+<file path=ppt/slides/slide11.xml><?xml version="1.0" encoding="utf-8"?>
+<p:sld xmlns:a="http://schemas.openxmlformats.org/drawingml/2006/main" xmlns:r="http://schemas.openxmlformats.org/officeDocument/2006/relationships" xmlns:p="http://schemas.openxmlformats.org/presentationml/2006/main">
+  <p:cSld>
+    <p:spTree>
+      <p:nvGrpSpPr>
+        <p:cNvPr id="1" name=""/>
+        <p:cNvGrpSpPr/>
+        <p:nvPr/>
+      </p:nvGrpSpPr>
+      <p:grpSpPr>
+        <a:xfrm>
+          <a:off x="0" y="0"/>
+          <a:ext cx="0" cy="0"/>
+          <a:chOff x="0" y="0"/>
+          <a:chExt cx="0" cy="0"/>
+        </a:xfrm>
+      </p:grpSpPr>
+      <p:sp>
+        <p:nvSpPr>
+          <p:cNvPr id="2" name="Title 1"/>
+          <p:cNvSpPr>
+            <a:spLocks noGrp="1"/>
+          </p:cNvSpPr>
+          <p:nvPr>
+            <p:ph type="title"/>
+          </p:nvPr>
+        </p:nvSpPr>
+        <p:spPr/>
+        <p:txBody>
+          <a:bodyPr/>
+          <a:lstStyle/>
+          <a:p>
+            <a:r>
+              <a:rPr lang="en-GB" dirty="0"/>
+              <a:t>Perform Web Requests </a:t>
+            </a:r>
+          </a:p>
+        </p:txBody>
+      </p:sp>
+      <p:sp>
+        <p:nvSpPr>
+          <p:cNvPr id="3" name="Text Placeholder 2"/>
+          <p:cNvSpPr>
+            <a:spLocks noGrp="1"/>
+          </p:cNvSpPr>
+          <p:nvPr>
+            <p:ph type="body" idx="1"/>
+          </p:nvPr>
+        </p:nvSpPr>
+        <p:spPr/>
+        <p:txBody>
+          <a:bodyPr/>
+          <a:lstStyle/>
+          <a:p>
+            <a:r>
+              <a:rPr lang="en-GB" dirty="0"/>
+              <a:t>The information will travel from a</a:t>
+            </a:r>
+          </a:p>
+          <a:p>
+            <a:pPr marL="342900" indent="-342900">
+              <a:buFont typeface="Arial" panose="020B0604020202020204" pitchFamily="34" charset="0"/>
+              <a:buChar char="•"/>
+            </a:pPr>
+            <a:r>
+              <a:rPr lang="en-GB" dirty="0"/>
+              <a:t>local (client) computer to</a:t>
+            </a:r>
+          </a:p>
+          <a:p>
+            <a:pPr marL="342900" indent="-342900">
+              <a:buFont typeface="Arial" panose="020B0604020202020204" pitchFamily="34" charset="0"/>
+              <a:buChar char="•"/>
+            </a:pPr>
+            <a:r>
+              <a:rPr lang="en-GB" dirty="0"/>
+              <a:t>a Local Area Network to</a:t>
+            </a:r>
+          </a:p>
+          <a:p>
+            <a:pPr marL="342900" indent="-342900">
+              <a:buFont typeface="Arial" panose="020B0604020202020204" pitchFamily="34" charset="0"/>
+              <a:buChar char="•"/>
+            </a:pPr>
+            <a:r>
+              <a:rPr lang="en-GB" dirty="0"/>
+              <a:t>the Internet to</a:t>
+            </a:r>
+          </a:p>
+          <a:p>
+            <a:pPr marL="342900" indent="-342900">
+              <a:buFont typeface="Arial" panose="020B0604020202020204" pitchFamily="34" charset="0"/>
+              <a:buChar char="•"/>
+            </a:pPr>
+            <a:r>
+              <a:rPr lang="en-GB" dirty="0"/>
+              <a:t>the website of your choice</a:t>
+            </a:r>
+            <a:endParaRPr lang="en-GB" dirty="0"/>
+          </a:p>
+        </p:txBody>
+      </p:sp>
+    </p:spTree>
+    <p:extLst>
+      <p:ext uri="{BB962C8B-B14F-4D97-AF65-F5344CB8AC3E}">
+        <p14:creationId xmlns:p14="http://schemas.microsoft.com/office/powerpoint/2010/main" val="1715086192"/>
+      </p:ext>
+    </p:extLst>
+  </p:cSld>
+  <p:clrMapOvr>
+    <a:masterClrMapping/>
+  </p:clrMapOvr>
+</p:sld>
+</file>
+
+<file path=ppt/slides/slide12.xml><?xml version="1.0" encoding="utf-8"?>
+<p:sld xmlns:a="http://schemas.openxmlformats.org/drawingml/2006/main" xmlns:r="http://schemas.openxmlformats.org/officeDocument/2006/relationships" xmlns:p="http://schemas.openxmlformats.org/presentationml/2006/main">
+  <p:cSld>
+    <p:spTree>
+      <p:nvGrpSpPr>
+        <p:cNvPr id="1" name=""/>
+        <p:cNvGrpSpPr/>
+        <p:nvPr/>
+      </p:nvGrpSpPr>
+      <p:grpSpPr>
+        <a:xfrm>
+          <a:off x="0" y="0"/>
+          <a:ext cx="0" cy="0"/>
+          <a:chOff x="0" y="0"/>
+          <a:chExt cx="0" cy="0"/>
+        </a:xfrm>
+      </p:grpSpPr>
+      <p:sp>
+        <p:nvSpPr>
+          <p:cNvPr id="2" name="Title 1"/>
+          <p:cNvSpPr>
+            <a:spLocks noGrp="1"/>
+          </p:cNvSpPr>
+          <p:nvPr>
+            <p:ph type="title"/>
+          </p:nvPr>
+        </p:nvSpPr>
+        <p:spPr/>
+        <p:txBody>
+          <a:bodyPr/>
+          <a:lstStyle/>
+          <a:p>
+            <a:r>
               <a:rPr lang="en-GB" smtClean="0"/>
               <a:t>Optional: IP Addresses</a:t>
             </a:r>
@@ -8453,7 +8950,7 @@
 </p:sld>
 </file>
 
-<file path=ppt/slides/slide11.xml><?xml version="1.0" encoding="utf-8"?>
+<file path=ppt/slides/slide13.xml><?xml version="1.0" encoding="utf-8"?>
 <p:sld xmlns:a="http://schemas.openxmlformats.org/drawingml/2006/main" xmlns:r="http://schemas.openxmlformats.org/officeDocument/2006/relationships" xmlns:p="http://schemas.openxmlformats.org/presentationml/2006/main">
   <p:cSld>
     <p:spTree>
@@ -9078,18 +9575,19 @@
             </a:r>
             <a:r>
               <a:rPr lang="en-GB" dirty="0"/>
-              <a:t>down different components of the web </a:t>
-            </a:r>
+              <a:t>down different components of the web  on your white boards.</a:t>
+            </a:r>
+          </a:p>
+          <a:p>
             <a:r>
               <a:rPr lang="en-GB" dirty="0"/>
-              <a:t> on your white boards.</a:t>
-            </a:r>
-          </a:p>
-          <a:p>
-            <a:r>
-              <a:rPr lang="en-GB" dirty="0"/>
-              <a:t>We will ask each group to write each different word on a post-it and add it below.</a:t>
-            </a:r>
+              <a:t>We will ask each group to </a:t>
+            </a:r>
+            <a:r>
+              <a:rPr lang="en-GB" dirty="0" smtClean="0"/>
+              <a:t>send someone up to draw on the whiteboard.</a:t>
+            </a:r>
+            <a:endParaRPr lang="en-GB" dirty="0"/>
           </a:p>
           <a:p>
             <a:pPr marL="0" indent="0">
@@ -9253,14 +9751,12 @@
           <a:lstStyle/>
           <a:p>
             <a:r>
+              <a:rPr lang="en-GB" dirty="0" smtClean="0"/>
+              <a:t>Work </a:t>
+            </a:r>
+            <a:r>
               <a:rPr lang="en-GB" dirty="0"/>
-              <a:t>By placing sticky notes on a board</a:t>
-            </a:r>
-          </a:p>
-          <a:p>
-            <a:r>
-              <a:rPr lang="en-GB" dirty="0"/>
-              <a:t>Work together to create a diagram of the internet.</a:t>
+              <a:t>together to create a diagram of the internet.</a:t>
             </a:r>
           </a:p>
         </p:txBody>
@@ -9341,72 +9837,12 @@
           <a:lstStyle/>
           <a:p>
             <a:r>
-              <a:rPr lang="en-GB" dirty="0"/>
-              <a:t>Show this introductory video to give learners a little more context</a:t>
-            </a:r>
-          </a:p>
-          <a:p>
-            <a:r>
-              <a:rPr lang="en-GB" dirty="0"/>
-              <a:t>The information will travel from </a:t>
-            </a:r>
-            <a:r>
-              <a:rPr lang="en-GB" dirty="0" smtClean="0"/>
-              <a:t>a</a:t>
-            </a:r>
-          </a:p>
-          <a:p>
-            <a:pPr marL="342900" indent="-342900">
-              <a:buFont typeface="Arial" panose="020B0604020202020204" pitchFamily="34" charset="0"/>
-              <a:buChar char="•"/>
-            </a:pPr>
-            <a:r>
-              <a:rPr lang="en-GB" dirty="0" smtClean="0"/>
-              <a:t>local (client) computer to</a:t>
-            </a:r>
-          </a:p>
-          <a:p>
-            <a:pPr marL="342900" indent="-342900">
-              <a:buFont typeface="Arial" panose="020B0604020202020204" pitchFamily="34" charset="0"/>
-              <a:buChar char="•"/>
-            </a:pPr>
-            <a:r>
-              <a:rPr lang="en-GB" dirty="0" smtClean="0"/>
-              <a:t>a </a:t>
-            </a:r>
-            <a:r>
-              <a:rPr lang="en-GB" dirty="0"/>
-              <a:t>Local Area Network </a:t>
-            </a:r>
-            <a:r>
-              <a:rPr lang="en-GB" dirty="0" smtClean="0"/>
-              <a:t>to</a:t>
-            </a:r>
-          </a:p>
-          <a:p>
-            <a:pPr marL="342900" indent="-342900">
-              <a:buFont typeface="Arial" panose="020B0604020202020204" pitchFamily="34" charset="0"/>
-              <a:buChar char="•"/>
-            </a:pPr>
-            <a:r>
-              <a:rPr lang="en-GB" dirty="0" smtClean="0"/>
-              <a:t>the Internet to</a:t>
-            </a:r>
-            <a:endParaRPr lang="en-GB" dirty="0"/>
-          </a:p>
-          <a:p>
-            <a:pPr marL="342900" indent="-342900">
-              <a:buFont typeface="Arial" panose="020B0604020202020204" pitchFamily="34" charset="0"/>
-              <a:buChar char="•"/>
-            </a:pPr>
-            <a:r>
-              <a:rPr lang="en-GB" dirty="0" smtClean="0"/>
-              <a:t>the </a:t>
-            </a:r>
-            <a:r>
-              <a:rPr lang="en-GB" dirty="0"/>
-              <a:t>website of your choice</a:t>
-            </a:r>
+              <a:rPr lang="en-GB" dirty="0">
+                <a:hlinkClick r:id="rId3"/>
+              </a:rPr>
+              <a:t>introductory video </a:t>
+            </a:r>
+            <a:endParaRPr lang="en-GB" dirty="0" smtClean="0"/>
           </a:p>
         </p:txBody>
       </p:sp>

</xml_diff>